<commit_message>
bug fix in the back cover
</commit_message>
<xml_diff>
--- a/Uchebnik-prakticheskaya-morfologia/Uchebnik-Prakticheskaya-morfologia-covers.pptx
+++ b/Uchebnik-prakticheskaya-morfologia/Uchebnik-Prakticheskaya-morfologia-covers.pptx
@@ -289,7 +289,7 @@
           <a:p>
             <a:fld id="{4629698E-7409-4BC9-B250-B7B44A58668C}" type="datetimeFigureOut">
               <a:rPr lang="en-US" smtClean="0"/>
-              <a:t>07.01.2012</a:t>
+              <a:t>08-12-2012</a:t>
             </a:fld>
             <a:endParaRPr lang="en-US"/>
           </a:p>
@@ -459,7 +459,7 @@
           <a:p>
             <a:fld id="{4629698E-7409-4BC9-B250-B7B44A58668C}" type="datetimeFigureOut">
               <a:rPr lang="en-US" smtClean="0"/>
-              <a:t>07.01.2012</a:t>
+              <a:t>08-12-2012</a:t>
             </a:fld>
             <a:endParaRPr lang="en-US"/>
           </a:p>
@@ -639,7 +639,7 @@
           <a:p>
             <a:fld id="{4629698E-7409-4BC9-B250-B7B44A58668C}" type="datetimeFigureOut">
               <a:rPr lang="en-US" smtClean="0"/>
-              <a:t>07.01.2012</a:t>
+              <a:t>08-12-2012</a:t>
             </a:fld>
             <a:endParaRPr lang="en-US"/>
           </a:p>
@@ -809,7 +809,7 @@
           <a:p>
             <a:fld id="{4629698E-7409-4BC9-B250-B7B44A58668C}" type="datetimeFigureOut">
               <a:rPr lang="en-US" smtClean="0"/>
-              <a:t>07.01.2012</a:t>
+              <a:t>08-12-2012</a:t>
             </a:fld>
             <a:endParaRPr lang="en-US"/>
           </a:p>
@@ -1055,7 +1055,7 @@
           <a:p>
             <a:fld id="{4629698E-7409-4BC9-B250-B7B44A58668C}" type="datetimeFigureOut">
               <a:rPr lang="en-US" smtClean="0"/>
-              <a:t>07.01.2012</a:t>
+              <a:t>08-12-2012</a:t>
             </a:fld>
             <a:endParaRPr lang="en-US"/>
           </a:p>
@@ -1343,7 +1343,7 @@
           <a:p>
             <a:fld id="{4629698E-7409-4BC9-B250-B7B44A58668C}" type="datetimeFigureOut">
               <a:rPr lang="en-US" smtClean="0"/>
-              <a:t>07.01.2012</a:t>
+              <a:t>08-12-2012</a:t>
             </a:fld>
             <a:endParaRPr lang="en-US"/>
           </a:p>
@@ -1770,7 +1770,7 @@
           <a:p>
             <a:fld id="{4629698E-7409-4BC9-B250-B7B44A58668C}" type="datetimeFigureOut">
               <a:rPr lang="en-US" smtClean="0"/>
-              <a:t>07.01.2012</a:t>
+              <a:t>08-12-2012</a:t>
             </a:fld>
             <a:endParaRPr lang="en-US"/>
           </a:p>
@@ -1888,7 +1888,7 @@
           <a:p>
             <a:fld id="{4629698E-7409-4BC9-B250-B7B44A58668C}" type="datetimeFigureOut">
               <a:rPr lang="en-US" smtClean="0"/>
-              <a:t>07.01.2012</a:t>
+              <a:t>08-12-2012</a:t>
             </a:fld>
             <a:endParaRPr lang="en-US"/>
           </a:p>
@@ -1983,7 +1983,7 @@
           <a:p>
             <a:fld id="{4629698E-7409-4BC9-B250-B7B44A58668C}" type="datetimeFigureOut">
               <a:rPr lang="en-US" smtClean="0"/>
-              <a:t>07.01.2012</a:t>
+              <a:t>08-12-2012</a:t>
             </a:fld>
             <a:endParaRPr lang="en-US"/>
           </a:p>
@@ -2260,7 +2260,7 @@
           <a:p>
             <a:fld id="{4629698E-7409-4BC9-B250-B7B44A58668C}" type="datetimeFigureOut">
               <a:rPr lang="en-US" smtClean="0"/>
-              <a:t>07.01.2012</a:t>
+              <a:t>08-12-2012</a:t>
             </a:fld>
             <a:endParaRPr lang="en-US"/>
           </a:p>
@@ -2513,7 +2513,7 @@
           <a:p>
             <a:fld id="{4629698E-7409-4BC9-B250-B7B44A58668C}" type="datetimeFigureOut">
               <a:rPr lang="en-US" smtClean="0"/>
-              <a:t>07.01.2012</a:t>
+              <a:t>08-12-2012</a:t>
             </a:fld>
             <a:endParaRPr lang="en-US"/>
           </a:p>
@@ -2726,7 +2726,7 @@
           <a:p>
             <a:fld id="{4629698E-7409-4BC9-B250-B7B44A58668C}" type="datetimeFigureOut">
               <a:rPr lang="en-US" smtClean="0"/>
-              <a:t>07.01.2012</a:t>
+              <a:t>08-12-2012</a:t>
             </a:fld>
             <a:endParaRPr lang="en-US"/>
           </a:p>
@@ -3953,27 +3953,7 @@
                   </a:glow>
                 </a:effectLst>
               </a:rPr>
-              <a:t>Великотырновский </a:t>
-            </a:r>
-            <a:r>
-              <a:rPr lang="ru-RU" sz="1200" b="1" smtClean="0">
-                <a:ln w="3175">
-                  <a:noFill/>
-                  <a:prstDash val="solid"/>
-                  <a:miter lim="800000"/>
-                </a:ln>
-                <a:solidFill>
-                  <a:srgbClr val="3B1615"/>
-                </a:solidFill>
-                <a:effectLst>
-                  <a:glow rad="63500">
-                    <a:schemeClr val="bg1">
-                      <a:alpha val="50000"/>
-                    </a:schemeClr>
-                  </a:glow>
-                </a:effectLst>
-              </a:rPr>
-              <a:t>университет </a:t>
+              <a:t>Великотырновский университет </a:t>
             </a:r>
             <a:r>
               <a:rPr lang="ru-RU" sz="1200" b="1" dirty="0" smtClean="0">
@@ -4046,8 +4026,8 @@
         </p:nvSpPr>
         <p:spPr>
           <a:xfrm>
-            <a:off x="188640" y="200472"/>
-            <a:ext cx="2589730" cy="2862322"/>
+            <a:off x="191696" y="200472"/>
+            <a:ext cx="2661240" cy="2631490"/>
           </a:xfrm>
           <a:prstGeom prst="rect">
             <a:avLst/>
@@ -4170,7 +4150,63 @@
                   </a:glow>
                 </a:effectLst>
               </a:rPr>
-              <a:t>Русского </a:t>
+              <a:t>Русистики </a:t>
+            </a:r>
+            <a:r>
+              <a:rPr lang="ru-RU" sz="1500" noProof="1" smtClean="0">
+                <a:effectLst>
+                  <a:glow rad="38100">
+                    <a:schemeClr val="accent5">
+                      <a:lumMod val="20000"/>
+                      <a:lumOff val="80000"/>
+                      <a:alpha val="40000"/>
+                    </a:schemeClr>
+                  </a:glow>
+                </a:effectLst>
+              </a:rPr>
+              <a:t>Велико-тырновского</a:t>
+            </a:r>
+            <a:r>
+              <a:rPr lang="ru-RU" sz="1500" dirty="0" smtClean="0">
+                <a:effectLst>
+                  <a:glow rad="38100">
+                    <a:schemeClr val="accent5">
+                      <a:lumMod val="20000"/>
+                      <a:lumOff val="80000"/>
+                      <a:alpha val="40000"/>
+                    </a:schemeClr>
+                  </a:glow>
+                </a:effectLst>
+              </a:rPr>
+              <a:t> университета </a:t>
+            </a:r>
+            <a:r>
+              <a:rPr lang="ru-RU" sz="1500" dirty="0" smtClean="0">
+                <a:effectLst>
+                  <a:glow rad="38100">
+                    <a:schemeClr val="accent5">
+                      <a:lumMod val="20000"/>
+                      <a:lumOff val="80000"/>
+                      <a:alpha val="40000"/>
+                    </a:schemeClr>
+                  </a:glow>
+                </a:effectLst>
+              </a:rPr>
+              <a:t>им. </a:t>
+            </a:r>
+            <a:r>
+              <a:rPr lang="ru-RU" sz="1500" dirty="0" smtClean="0">
+                <a:effectLst>
+                  <a:glow rad="38100">
+                    <a:schemeClr val="accent5">
+                      <a:lumMod val="20000"/>
+                      <a:lumOff val="80000"/>
+                      <a:alpha val="40000"/>
+                    </a:schemeClr>
+                  </a:glow>
+                </a:effectLst>
+              </a:rPr>
+              <a:t>Святых Ки­рилла</a:t>
             </a:r>
             <a:r>
               <a:rPr lang="ru-RU" sz="1500" dirty="0">
@@ -4184,63 +4220,8 @@
                   </a:glow>
                 </a:effectLst>
               </a:rPr>
-              <a:t>языка </a:t>
-            </a:r>
-            <a:r>
-              <a:rPr lang="ru-RU" sz="1500" dirty="0" smtClean="0">
-                <a:effectLst>
-                  <a:glow rad="38100">
-                    <a:schemeClr val="accent5">
-                      <a:lumMod val="20000"/>
-                      <a:lumOff val="80000"/>
-                      <a:alpha val="40000"/>
-                    </a:schemeClr>
-                  </a:glow>
-                </a:effectLst>
-              </a:rPr>
-              <a:t>Великотырновского универ-ситета им. </a:t>
-            </a:r>
-            <a:r>
-              <a:rPr lang="ru-RU" sz="1500" dirty="0">
-                <a:effectLst>
-                  <a:glow rad="38100">
-                    <a:schemeClr val="accent5">
-                      <a:lumMod val="20000"/>
-                      <a:lumOff val="80000"/>
-                      <a:alpha val="40000"/>
-                    </a:schemeClr>
-                  </a:glow>
-                </a:effectLst>
-              </a:rPr>
-              <a:t>Святых </a:t>
-            </a:r>
-            <a:r>
-              <a:rPr lang="ru-RU" sz="1500" dirty="0" smtClean="0">
-                <a:effectLst>
-                  <a:glow rad="38100">
-                    <a:schemeClr val="accent5">
-                      <a:lumMod val="20000"/>
-                      <a:lumOff val="80000"/>
-                      <a:alpha val="40000"/>
-                    </a:schemeClr>
-                  </a:glow>
-                </a:effectLst>
-              </a:rPr>
-              <a:t>Ки­рилла</a:t>
-            </a:r>
-            <a:br>
-              <a:rPr lang="ru-RU" sz="1500" dirty="0" smtClean="0">
-                <a:effectLst>
-                  <a:glow rad="38100">
-                    <a:schemeClr val="accent5">
-                      <a:lumMod val="20000"/>
-                      <a:lumOff val="80000"/>
-                      <a:alpha val="40000"/>
-                    </a:schemeClr>
-                  </a:glow>
-                </a:effectLst>
-              </a:rPr>
-            </a:br>
+              <a:t> </a:t>
+            </a:r>
             <a:r>
               <a:rPr lang="ru-RU" sz="1500" dirty="0" smtClean="0">
                 <a:effectLst>

</xml_diff>